<commit_message>
Corrections to lesson 14 plus lesson 15
</commit_message>
<xml_diff>
--- a/slides/klasse14.pptx
+++ b/slides/klasse14.pptx
@@ -209,7 +209,7 @@
           <a:p>
             <a:fld id="{CFFAA695-90E8-5440-B45F-66D3E33CB87C}" type="datetimeFigureOut">
               <a:rPr lang="en-GB" smtClean="0"/>
-              <a:t>02/09/2016</a:t>
+              <a:t>08/09/2016</a:t>
             </a:fld>
             <a:endParaRPr lang="en-GB"/>
           </a:p>
@@ -753,7 +753,7 @@
             <a:fld id="{B61BEF0D-F0BB-DE4B-95CE-6DB70DBA9567}" type="datetimeFigureOut">
               <a:rPr lang="en-US" dirty="0"/>
               <a:pPr/>
-              <a:t>9/2/16</a:t>
+              <a:t>9/8/16</a:t>
             </a:fld>
             <a:endParaRPr lang="en-US" dirty="0"/>
           </a:p>
@@ -1186,7 +1186,7 @@
             <a:fld id="{B61BEF0D-F0BB-DE4B-95CE-6DB70DBA9567}" type="datetimeFigureOut">
               <a:rPr lang="en-US" dirty="0"/>
               <a:pPr/>
-              <a:t>9/2/16</a:t>
+              <a:t>9/8/16</a:t>
             </a:fld>
             <a:endParaRPr lang="en-US" dirty="0"/>
           </a:p>
@@ -1433,7 +1433,7 @@
             <a:fld id="{B61BEF0D-F0BB-DE4B-95CE-6DB70DBA9567}" type="datetimeFigureOut">
               <a:rPr lang="en-US" dirty="0"/>
               <a:pPr/>
-              <a:t>9/2/16</a:t>
+              <a:t>9/8/16</a:t>
             </a:fld>
             <a:endParaRPr lang="en-US" dirty="0"/>
           </a:p>
@@ -1738,7 +1738,7 @@
             <a:fld id="{B61BEF0D-F0BB-DE4B-95CE-6DB70DBA9567}" type="datetimeFigureOut">
               <a:rPr lang="en-US" dirty="0"/>
               <a:pPr/>
-              <a:t>9/2/16</a:t>
+              <a:t>9/8/16</a:t>
             </a:fld>
             <a:endParaRPr lang="en-US" dirty="0"/>
           </a:p>
@@ -2053,7 +2053,7 @@
             <a:fld id="{B61BEF0D-F0BB-DE4B-95CE-6DB70DBA9567}" type="datetimeFigureOut">
               <a:rPr lang="en-US" dirty="0"/>
               <a:pPr/>
-              <a:t>9/2/16</a:t>
+              <a:t>9/8/16</a:t>
             </a:fld>
             <a:endParaRPr lang="en-US" dirty="0"/>
           </a:p>
@@ -2352,7 +2352,7 @@
             <a:fld id="{B61BEF0D-F0BB-DE4B-95CE-6DB70DBA9567}" type="datetimeFigureOut">
               <a:rPr lang="en-US" dirty="0"/>
               <a:pPr/>
-              <a:t>9/2/16</a:t>
+              <a:t>9/8/16</a:t>
             </a:fld>
             <a:endParaRPr lang="en-US" dirty="0"/>
           </a:p>
@@ -2716,7 +2716,7 @@
             <a:fld id="{B61BEF0D-F0BB-DE4B-95CE-6DB70DBA9567}" type="datetimeFigureOut">
               <a:rPr lang="en-US" dirty="0"/>
               <a:pPr/>
-              <a:t>9/2/16</a:t>
+              <a:t>9/8/16</a:t>
             </a:fld>
             <a:endParaRPr lang="en-US" dirty="0"/>
           </a:p>
@@ -2887,7 +2887,7 @@
             <a:fld id="{B61BEF0D-F0BB-DE4B-95CE-6DB70DBA9567}" type="datetimeFigureOut">
               <a:rPr lang="en-US" dirty="0"/>
               <a:pPr/>
-              <a:t>9/2/16</a:t>
+              <a:t>9/8/16</a:t>
             </a:fld>
             <a:endParaRPr lang="en-US" dirty="0"/>
           </a:p>
@@ -3064,7 +3064,7 @@
             <a:fld id="{B61BEF0D-F0BB-DE4B-95CE-6DB70DBA9567}" type="datetimeFigureOut">
               <a:rPr lang="en-US" dirty="0"/>
               <a:pPr/>
-              <a:t>9/2/16</a:t>
+              <a:t>9/8/16</a:t>
             </a:fld>
             <a:endParaRPr lang="en-US" dirty="0"/>
           </a:p>
@@ -3231,7 +3231,7 @@
             <a:fld id="{B61BEF0D-F0BB-DE4B-95CE-6DB70DBA9567}" type="datetimeFigureOut">
               <a:rPr lang="en-US" dirty="0"/>
               <a:pPr/>
-              <a:t>9/2/16</a:t>
+              <a:t>9/8/16</a:t>
             </a:fld>
             <a:endParaRPr lang="en-US" dirty="0"/>
           </a:p>
@@ -3478,7 +3478,7 @@
             <a:fld id="{B61BEF0D-F0BB-DE4B-95CE-6DB70DBA9567}" type="datetimeFigureOut">
               <a:rPr lang="en-US" dirty="0"/>
               <a:pPr/>
-              <a:t>9/2/16</a:t>
+              <a:t>9/8/16</a:t>
             </a:fld>
             <a:endParaRPr lang="en-US" dirty="0"/>
           </a:p>
@@ -3711,7 +3711,7 @@
             <a:fld id="{B61BEF0D-F0BB-DE4B-95CE-6DB70DBA9567}" type="datetimeFigureOut">
               <a:rPr lang="en-US" dirty="0"/>
               <a:pPr/>
-              <a:t>9/2/16</a:t>
+              <a:t>9/8/16</a:t>
             </a:fld>
             <a:endParaRPr lang="en-US" dirty="0"/>
           </a:p>
@@ -4090,7 +4090,7 @@
             <a:fld id="{B61BEF0D-F0BB-DE4B-95CE-6DB70DBA9567}" type="datetimeFigureOut">
               <a:rPr lang="en-US" dirty="0"/>
               <a:pPr/>
-              <a:t>9/2/16</a:t>
+              <a:t>9/8/16</a:t>
             </a:fld>
             <a:endParaRPr lang="en-US" dirty="0"/>
           </a:p>
@@ -4205,7 +4205,7 @@
             <a:fld id="{B61BEF0D-F0BB-DE4B-95CE-6DB70DBA9567}" type="datetimeFigureOut">
               <a:rPr lang="en-US" dirty="0"/>
               <a:pPr/>
-              <a:t>9/2/16</a:t>
+              <a:t>9/8/16</a:t>
             </a:fld>
             <a:endParaRPr lang="en-US" dirty="0"/>
           </a:p>
@@ -4297,7 +4297,7 @@
             <a:fld id="{B61BEF0D-F0BB-DE4B-95CE-6DB70DBA9567}" type="datetimeFigureOut">
               <a:rPr lang="en-US" dirty="0"/>
               <a:pPr/>
-              <a:t>9/2/16</a:t>
+              <a:t>9/8/16</a:t>
             </a:fld>
             <a:endParaRPr lang="en-US" dirty="0"/>
           </a:p>
@@ -4549,7 +4549,7 @@
             <a:fld id="{B61BEF0D-F0BB-DE4B-95CE-6DB70DBA9567}" type="datetimeFigureOut">
               <a:rPr lang="en-US" dirty="0"/>
               <a:pPr/>
-              <a:t>9/2/16</a:t>
+              <a:t>9/8/16</a:t>
             </a:fld>
             <a:endParaRPr lang="en-US" dirty="0"/>
           </a:p>
@@ -4829,7 +4829,7 @@
             <a:fld id="{B61BEF0D-F0BB-DE4B-95CE-6DB70DBA9567}" type="datetimeFigureOut">
               <a:rPr lang="en-US" dirty="0"/>
               <a:pPr/>
-              <a:t>9/2/16</a:t>
+              <a:t>9/8/16</a:t>
             </a:fld>
             <a:endParaRPr lang="en-US" dirty="0"/>
           </a:p>
@@ -5232,7 +5232,7 @@
             <a:fld id="{B61BEF0D-F0BB-DE4B-95CE-6DB70DBA9567}" type="datetimeFigureOut">
               <a:rPr lang="en-US" dirty="0"/>
               <a:pPr/>
-              <a:t>9/2/16</a:t>
+              <a:t>9/8/16</a:t>
             </a:fld>
             <a:endParaRPr lang="en-US" dirty="0"/>
           </a:p>
@@ -5831,6 +5831,13 @@
   <p:clrMapOvr>
     <a:masterClrMapping/>
   </p:clrMapOvr>
+  <p:timing>
+    <p:tnLst>
+      <p:par>
+        <p:cTn id="1" dur="indefinite" restart="never" nodeType="tmRoot"/>
+      </p:par>
+    </p:tnLst>
+  </p:timing>
 </p:sld>
 </file>
 
@@ -6047,6 +6054,161 @@
   <p:clrMapOvr>
     <a:masterClrMapping/>
   </p:clrMapOvr>
+  <p:timing>
+    <p:tnLst>
+      <p:par>
+        <p:cTn id="1" dur="indefinite" restart="never" nodeType="tmRoot">
+          <p:childTnLst>
+            <p:seq concurrent="1" nextAc="seek">
+              <p:cTn id="2" dur="indefinite" nodeType="mainSeq">
+                <p:childTnLst>
+                  <p:par>
+                    <p:cTn id="3" fill="hold">
+                      <p:stCondLst>
+                        <p:cond delay="indefinite"/>
+                      </p:stCondLst>
+                      <p:childTnLst>
+                        <p:par>
+                          <p:cTn id="4" fill="hold">
+                            <p:stCondLst>
+                              <p:cond delay="0"/>
+                            </p:stCondLst>
+                            <p:childTnLst>
+                              <p:par>
+                                <p:cTn id="5" presetID="18" presetClass="entr" presetSubtype="12" fill="hold" grpId="0" nodeType="clickEffect">
+                                  <p:stCondLst>
+                                    <p:cond delay="0"/>
+                                  </p:stCondLst>
+                                  <p:childTnLst>
+                                    <p:set>
+                                      <p:cBhvr>
+                                        <p:cTn id="6" dur="1" fill="hold">
+                                          <p:stCondLst>
+                                            <p:cond delay="0"/>
+                                          </p:stCondLst>
+                                        </p:cTn>
+                                        <p:tgtEl>
+                                          <p:spTgt spid="4">
+                                            <p:txEl>
+                                              <p:pRg st="0" end="0"/>
+                                            </p:txEl>
+                                          </p:spTgt>
+                                        </p:tgtEl>
+                                        <p:attrNameLst>
+                                          <p:attrName>style.visibility</p:attrName>
+                                        </p:attrNameLst>
+                                      </p:cBhvr>
+                                      <p:to>
+                                        <p:strVal val="visible"/>
+                                      </p:to>
+                                    </p:set>
+                                    <p:animEffect transition="in" filter="strips(downLeft)">
+                                      <p:cBhvr>
+                                        <p:cTn id="7" dur="500"/>
+                                        <p:tgtEl>
+                                          <p:spTgt spid="4">
+                                            <p:txEl>
+                                              <p:pRg st="0" end="0"/>
+                                            </p:txEl>
+                                          </p:spTgt>
+                                        </p:tgtEl>
+                                      </p:cBhvr>
+                                    </p:animEffect>
+                                  </p:childTnLst>
+                                </p:cTn>
+                              </p:par>
+                            </p:childTnLst>
+                          </p:cTn>
+                        </p:par>
+                      </p:childTnLst>
+                    </p:cTn>
+                  </p:par>
+                  <p:par>
+                    <p:cTn id="8" fill="hold">
+                      <p:stCondLst>
+                        <p:cond delay="indefinite"/>
+                      </p:stCondLst>
+                      <p:childTnLst>
+                        <p:par>
+                          <p:cTn id="9" fill="hold">
+                            <p:stCondLst>
+                              <p:cond delay="0"/>
+                            </p:stCondLst>
+                            <p:childTnLst>
+                              <p:par>
+                                <p:cTn id="10" presetID="18" presetClass="entr" presetSubtype="12" fill="hold" grpId="0" nodeType="clickEffect">
+                                  <p:stCondLst>
+                                    <p:cond delay="0"/>
+                                  </p:stCondLst>
+                                  <p:childTnLst>
+                                    <p:set>
+                                      <p:cBhvr>
+                                        <p:cTn id="11" dur="1" fill="hold">
+                                          <p:stCondLst>
+                                            <p:cond delay="0"/>
+                                          </p:stCondLst>
+                                        </p:cTn>
+                                        <p:tgtEl>
+                                          <p:spTgt spid="4">
+                                            <p:txEl>
+                                              <p:pRg st="2" end="2"/>
+                                            </p:txEl>
+                                          </p:spTgt>
+                                        </p:tgtEl>
+                                        <p:attrNameLst>
+                                          <p:attrName>style.visibility</p:attrName>
+                                        </p:attrNameLst>
+                                      </p:cBhvr>
+                                      <p:to>
+                                        <p:strVal val="visible"/>
+                                      </p:to>
+                                    </p:set>
+                                    <p:animEffect transition="in" filter="strips(downLeft)">
+                                      <p:cBhvr>
+                                        <p:cTn id="12" dur="500"/>
+                                        <p:tgtEl>
+                                          <p:spTgt spid="4">
+                                            <p:txEl>
+                                              <p:pRg st="2" end="2"/>
+                                            </p:txEl>
+                                          </p:spTgt>
+                                        </p:tgtEl>
+                                      </p:cBhvr>
+                                    </p:animEffect>
+                                  </p:childTnLst>
+                                </p:cTn>
+                              </p:par>
+                            </p:childTnLst>
+                          </p:cTn>
+                        </p:par>
+                      </p:childTnLst>
+                    </p:cTn>
+                  </p:par>
+                </p:childTnLst>
+              </p:cTn>
+              <p:prevCondLst>
+                <p:cond evt="onPrev" delay="0">
+                  <p:tgtEl>
+                    <p:sldTgt/>
+                  </p:tgtEl>
+                </p:cond>
+              </p:prevCondLst>
+              <p:nextCondLst>
+                <p:cond evt="onNext" delay="0">
+                  <p:tgtEl>
+                    <p:sldTgt/>
+                  </p:tgtEl>
+                </p:cond>
+              </p:nextCondLst>
+            </p:seq>
+          </p:childTnLst>
+        </p:cTn>
+      </p:par>
+    </p:tnLst>
+    <p:bldLst>
+      <p:bldP spid="4" grpId="0" build="p"/>
+    </p:bldLst>
+  </p:timing>
 </p:sld>
 </file>
 
@@ -6230,6 +6392,161 @@
   <p:clrMapOvr>
     <a:masterClrMapping/>
   </p:clrMapOvr>
+  <p:timing>
+    <p:tnLst>
+      <p:par>
+        <p:cTn id="1" dur="indefinite" restart="never" nodeType="tmRoot">
+          <p:childTnLst>
+            <p:seq concurrent="1" nextAc="seek">
+              <p:cTn id="2" dur="indefinite" nodeType="mainSeq">
+                <p:childTnLst>
+                  <p:par>
+                    <p:cTn id="3" fill="hold">
+                      <p:stCondLst>
+                        <p:cond delay="indefinite"/>
+                      </p:stCondLst>
+                      <p:childTnLst>
+                        <p:par>
+                          <p:cTn id="4" fill="hold">
+                            <p:stCondLst>
+                              <p:cond delay="0"/>
+                            </p:stCondLst>
+                            <p:childTnLst>
+                              <p:par>
+                                <p:cTn id="5" presetID="18" presetClass="entr" presetSubtype="12" fill="hold" grpId="0" nodeType="clickEffect">
+                                  <p:stCondLst>
+                                    <p:cond delay="0"/>
+                                  </p:stCondLst>
+                                  <p:childTnLst>
+                                    <p:set>
+                                      <p:cBhvr>
+                                        <p:cTn id="6" dur="1" fill="hold">
+                                          <p:stCondLst>
+                                            <p:cond delay="0"/>
+                                          </p:stCondLst>
+                                        </p:cTn>
+                                        <p:tgtEl>
+                                          <p:spTgt spid="5">
+                                            <p:txEl>
+                                              <p:pRg st="0" end="0"/>
+                                            </p:txEl>
+                                          </p:spTgt>
+                                        </p:tgtEl>
+                                        <p:attrNameLst>
+                                          <p:attrName>style.visibility</p:attrName>
+                                        </p:attrNameLst>
+                                      </p:cBhvr>
+                                      <p:to>
+                                        <p:strVal val="visible"/>
+                                      </p:to>
+                                    </p:set>
+                                    <p:animEffect transition="in" filter="strips(downLeft)">
+                                      <p:cBhvr>
+                                        <p:cTn id="7" dur="500"/>
+                                        <p:tgtEl>
+                                          <p:spTgt spid="5">
+                                            <p:txEl>
+                                              <p:pRg st="0" end="0"/>
+                                            </p:txEl>
+                                          </p:spTgt>
+                                        </p:tgtEl>
+                                      </p:cBhvr>
+                                    </p:animEffect>
+                                  </p:childTnLst>
+                                </p:cTn>
+                              </p:par>
+                            </p:childTnLst>
+                          </p:cTn>
+                        </p:par>
+                      </p:childTnLst>
+                    </p:cTn>
+                  </p:par>
+                  <p:par>
+                    <p:cTn id="8" fill="hold">
+                      <p:stCondLst>
+                        <p:cond delay="indefinite"/>
+                      </p:stCondLst>
+                      <p:childTnLst>
+                        <p:par>
+                          <p:cTn id="9" fill="hold">
+                            <p:stCondLst>
+                              <p:cond delay="0"/>
+                            </p:stCondLst>
+                            <p:childTnLst>
+                              <p:par>
+                                <p:cTn id="10" presetID="18" presetClass="entr" presetSubtype="12" fill="hold" grpId="0" nodeType="clickEffect">
+                                  <p:stCondLst>
+                                    <p:cond delay="0"/>
+                                  </p:stCondLst>
+                                  <p:childTnLst>
+                                    <p:set>
+                                      <p:cBhvr>
+                                        <p:cTn id="11" dur="1" fill="hold">
+                                          <p:stCondLst>
+                                            <p:cond delay="0"/>
+                                          </p:stCondLst>
+                                        </p:cTn>
+                                        <p:tgtEl>
+                                          <p:spTgt spid="5">
+                                            <p:txEl>
+                                              <p:pRg st="2" end="2"/>
+                                            </p:txEl>
+                                          </p:spTgt>
+                                        </p:tgtEl>
+                                        <p:attrNameLst>
+                                          <p:attrName>style.visibility</p:attrName>
+                                        </p:attrNameLst>
+                                      </p:cBhvr>
+                                      <p:to>
+                                        <p:strVal val="visible"/>
+                                      </p:to>
+                                    </p:set>
+                                    <p:animEffect transition="in" filter="strips(downLeft)">
+                                      <p:cBhvr>
+                                        <p:cTn id="12" dur="500"/>
+                                        <p:tgtEl>
+                                          <p:spTgt spid="5">
+                                            <p:txEl>
+                                              <p:pRg st="2" end="2"/>
+                                            </p:txEl>
+                                          </p:spTgt>
+                                        </p:tgtEl>
+                                      </p:cBhvr>
+                                    </p:animEffect>
+                                  </p:childTnLst>
+                                </p:cTn>
+                              </p:par>
+                            </p:childTnLst>
+                          </p:cTn>
+                        </p:par>
+                      </p:childTnLst>
+                    </p:cTn>
+                  </p:par>
+                </p:childTnLst>
+              </p:cTn>
+              <p:prevCondLst>
+                <p:cond evt="onPrev" delay="0">
+                  <p:tgtEl>
+                    <p:sldTgt/>
+                  </p:tgtEl>
+                </p:cond>
+              </p:prevCondLst>
+              <p:nextCondLst>
+                <p:cond evt="onNext" delay="0">
+                  <p:tgtEl>
+                    <p:sldTgt/>
+                  </p:tgtEl>
+                </p:cond>
+              </p:nextCondLst>
+            </p:seq>
+          </p:childTnLst>
+        </p:cTn>
+      </p:par>
+    </p:tnLst>
+    <p:bldLst>
+      <p:bldP spid="5" grpId="0" build="p"/>
+    </p:bldLst>
+  </p:timing>
 </p:sld>
 </file>
 
@@ -6446,6 +6763,13 @@
   <p:clrMapOvr>
     <a:masterClrMapping/>
   </p:clrMapOvr>
+  <p:timing>
+    <p:tnLst>
+      <p:par>
+        <p:cTn id="1" dur="indefinite" restart="never" nodeType="tmRoot"/>
+      </p:par>
+    </p:tnLst>
+  </p:timing>
 </p:sld>
 </file>
 
@@ -6646,6 +6970,13 @@
   <p:clrMapOvr>
     <a:masterClrMapping/>
   </p:clrMapOvr>
+  <p:timing>
+    <p:tnLst>
+      <p:par>
+        <p:cTn id="1" dur="indefinite" restart="never" nodeType="tmRoot"/>
+      </p:par>
+    </p:tnLst>
+  </p:timing>
 </p:sld>
 </file>
 
@@ -6831,6 +7162,161 @@
   <p:clrMapOvr>
     <a:masterClrMapping/>
   </p:clrMapOvr>
+  <p:timing>
+    <p:tnLst>
+      <p:par>
+        <p:cTn id="1" dur="indefinite" restart="never" nodeType="tmRoot">
+          <p:childTnLst>
+            <p:seq concurrent="1" nextAc="seek">
+              <p:cTn id="2" dur="indefinite" nodeType="mainSeq">
+                <p:childTnLst>
+                  <p:par>
+                    <p:cTn id="3" fill="hold">
+                      <p:stCondLst>
+                        <p:cond delay="indefinite"/>
+                      </p:stCondLst>
+                      <p:childTnLst>
+                        <p:par>
+                          <p:cTn id="4" fill="hold">
+                            <p:stCondLst>
+                              <p:cond delay="0"/>
+                            </p:stCondLst>
+                            <p:childTnLst>
+                              <p:par>
+                                <p:cTn id="5" presetID="18" presetClass="entr" presetSubtype="12" fill="hold" grpId="0" nodeType="clickEffect">
+                                  <p:stCondLst>
+                                    <p:cond delay="0"/>
+                                  </p:stCondLst>
+                                  <p:childTnLst>
+                                    <p:set>
+                                      <p:cBhvr>
+                                        <p:cTn id="6" dur="1" fill="hold">
+                                          <p:stCondLst>
+                                            <p:cond delay="0"/>
+                                          </p:stCondLst>
+                                        </p:cTn>
+                                        <p:tgtEl>
+                                          <p:spTgt spid="5">
+                                            <p:txEl>
+                                              <p:pRg st="0" end="0"/>
+                                            </p:txEl>
+                                          </p:spTgt>
+                                        </p:tgtEl>
+                                        <p:attrNameLst>
+                                          <p:attrName>style.visibility</p:attrName>
+                                        </p:attrNameLst>
+                                      </p:cBhvr>
+                                      <p:to>
+                                        <p:strVal val="visible"/>
+                                      </p:to>
+                                    </p:set>
+                                    <p:animEffect transition="in" filter="strips(downLeft)">
+                                      <p:cBhvr>
+                                        <p:cTn id="7" dur="500"/>
+                                        <p:tgtEl>
+                                          <p:spTgt spid="5">
+                                            <p:txEl>
+                                              <p:pRg st="0" end="0"/>
+                                            </p:txEl>
+                                          </p:spTgt>
+                                        </p:tgtEl>
+                                      </p:cBhvr>
+                                    </p:animEffect>
+                                  </p:childTnLst>
+                                </p:cTn>
+                              </p:par>
+                            </p:childTnLst>
+                          </p:cTn>
+                        </p:par>
+                      </p:childTnLst>
+                    </p:cTn>
+                  </p:par>
+                  <p:par>
+                    <p:cTn id="8" fill="hold">
+                      <p:stCondLst>
+                        <p:cond delay="indefinite"/>
+                      </p:stCondLst>
+                      <p:childTnLst>
+                        <p:par>
+                          <p:cTn id="9" fill="hold">
+                            <p:stCondLst>
+                              <p:cond delay="0"/>
+                            </p:stCondLst>
+                            <p:childTnLst>
+                              <p:par>
+                                <p:cTn id="10" presetID="18" presetClass="entr" presetSubtype="12" fill="hold" grpId="0" nodeType="clickEffect">
+                                  <p:stCondLst>
+                                    <p:cond delay="0"/>
+                                  </p:stCondLst>
+                                  <p:childTnLst>
+                                    <p:set>
+                                      <p:cBhvr>
+                                        <p:cTn id="11" dur="1" fill="hold">
+                                          <p:stCondLst>
+                                            <p:cond delay="0"/>
+                                          </p:stCondLst>
+                                        </p:cTn>
+                                        <p:tgtEl>
+                                          <p:spTgt spid="5">
+                                            <p:txEl>
+                                              <p:pRg st="2" end="2"/>
+                                            </p:txEl>
+                                          </p:spTgt>
+                                        </p:tgtEl>
+                                        <p:attrNameLst>
+                                          <p:attrName>style.visibility</p:attrName>
+                                        </p:attrNameLst>
+                                      </p:cBhvr>
+                                      <p:to>
+                                        <p:strVal val="visible"/>
+                                      </p:to>
+                                    </p:set>
+                                    <p:animEffect transition="in" filter="strips(downLeft)">
+                                      <p:cBhvr>
+                                        <p:cTn id="12" dur="500"/>
+                                        <p:tgtEl>
+                                          <p:spTgt spid="5">
+                                            <p:txEl>
+                                              <p:pRg st="2" end="2"/>
+                                            </p:txEl>
+                                          </p:spTgt>
+                                        </p:tgtEl>
+                                      </p:cBhvr>
+                                    </p:animEffect>
+                                  </p:childTnLst>
+                                </p:cTn>
+                              </p:par>
+                            </p:childTnLst>
+                          </p:cTn>
+                        </p:par>
+                      </p:childTnLst>
+                    </p:cTn>
+                  </p:par>
+                </p:childTnLst>
+              </p:cTn>
+              <p:prevCondLst>
+                <p:cond evt="onPrev" delay="0">
+                  <p:tgtEl>
+                    <p:sldTgt/>
+                  </p:tgtEl>
+                </p:cond>
+              </p:prevCondLst>
+              <p:nextCondLst>
+                <p:cond evt="onNext" delay="0">
+                  <p:tgtEl>
+                    <p:sldTgt/>
+                  </p:tgtEl>
+                </p:cond>
+              </p:nextCondLst>
+            </p:seq>
+          </p:childTnLst>
+        </p:cTn>
+      </p:par>
+    </p:tnLst>
+    <p:bldLst>
+      <p:bldP spid="5" grpId="0" build="p"/>
+    </p:bldLst>
+  </p:timing>
 </p:sld>
 </file>
 
@@ -6989,6 +7475,161 @@
   <p:clrMapOvr>
     <a:masterClrMapping/>
   </p:clrMapOvr>
+  <p:timing>
+    <p:tnLst>
+      <p:par>
+        <p:cTn id="1" dur="indefinite" restart="never" nodeType="tmRoot">
+          <p:childTnLst>
+            <p:seq concurrent="1" nextAc="seek">
+              <p:cTn id="2" dur="indefinite" nodeType="mainSeq">
+                <p:childTnLst>
+                  <p:par>
+                    <p:cTn id="3" fill="hold">
+                      <p:stCondLst>
+                        <p:cond delay="indefinite"/>
+                      </p:stCondLst>
+                      <p:childTnLst>
+                        <p:par>
+                          <p:cTn id="4" fill="hold">
+                            <p:stCondLst>
+                              <p:cond delay="0"/>
+                            </p:stCondLst>
+                            <p:childTnLst>
+                              <p:par>
+                                <p:cTn id="5" presetID="18" presetClass="entr" presetSubtype="12" fill="hold" grpId="0" nodeType="clickEffect">
+                                  <p:stCondLst>
+                                    <p:cond delay="0"/>
+                                  </p:stCondLst>
+                                  <p:childTnLst>
+                                    <p:set>
+                                      <p:cBhvr>
+                                        <p:cTn id="6" dur="1" fill="hold">
+                                          <p:stCondLst>
+                                            <p:cond delay="0"/>
+                                          </p:stCondLst>
+                                        </p:cTn>
+                                        <p:tgtEl>
+                                          <p:spTgt spid="4">
+                                            <p:txEl>
+                                              <p:pRg st="0" end="0"/>
+                                            </p:txEl>
+                                          </p:spTgt>
+                                        </p:tgtEl>
+                                        <p:attrNameLst>
+                                          <p:attrName>style.visibility</p:attrName>
+                                        </p:attrNameLst>
+                                      </p:cBhvr>
+                                      <p:to>
+                                        <p:strVal val="visible"/>
+                                      </p:to>
+                                    </p:set>
+                                    <p:animEffect transition="in" filter="strips(downLeft)">
+                                      <p:cBhvr>
+                                        <p:cTn id="7" dur="500"/>
+                                        <p:tgtEl>
+                                          <p:spTgt spid="4">
+                                            <p:txEl>
+                                              <p:pRg st="0" end="0"/>
+                                            </p:txEl>
+                                          </p:spTgt>
+                                        </p:tgtEl>
+                                      </p:cBhvr>
+                                    </p:animEffect>
+                                  </p:childTnLst>
+                                </p:cTn>
+                              </p:par>
+                            </p:childTnLst>
+                          </p:cTn>
+                        </p:par>
+                      </p:childTnLst>
+                    </p:cTn>
+                  </p:par>
+                  <p:par>
+                    <p:cTn id="8" fill="hold">
+                      <p:stCondLst>
+                        <p:cond delay="indefinite"/>
+                      </p:stCondLst>
+                      <p:childTnLst>
+                        <p:par>
+                          <p:cTn id="9" fill="hold">
+                            <p:stCondLst>
+                              <p:cond delay="0"/>
+                            </p:stCondLst>
+                            <p:childTnLst>
+                              <p:par>
+                                <p:cTn id="10" presetID="18" presetClass="entr" presetSubtype="12" fill="hold" grpId="0" nodeType="clickEffect">
+                                  <p:stCondLst>
+                                    <p:cond delay="0"/>
+                                  </p:stCondLst>
+                                  <p:childTnLst>
+                                    <p:set>
+                                      <p:cBhvr>
+                                        <p:cTn id="11" dur="1" fill="hold">
+                                          <p:stCondLst>
+                                            <p:cond delay="0"/>
+                                          </p:stCondLst>
+                                        </p:cTn>
+                                        <p:tgtEl>
+                                          <p:spTgt spid="4">
+                                            <p:txEl>
+                                              <p:pRg st="2" end="2"/>
+                                            </p:txEl>
+                                          </p:spTgt>
+                                        </p:tgtEl>
+                                        <p:attrNameLst>
+                                          <p:attrName>style.visibility</p:attrName>
+                                        </p:attrNameLst>
+                                      </p:cBhvr>
+                                      <p:to>
+                                        <p:strVal val="visible"/>
+                                      </p:to>
+                                    </p:set>
+                                    <p:animEffect transition="in" filter="strips(downLeft)">
+                                      <p:cBhvr>
+                                        <p:cTn id="12" dur="500"/>
+                                        <p:tgtEl>
+                                          <p:spTgt spid="4">
+                                            <p:txEl>
+                                              <p:pRg st="2" end="2"/>
+                                            </p:txEl>
+                                          </p:spTgt>
+                                        </p:tgtEl>
+                                      </p:cBhvr>
+                                    </p:animEffect>
+                                  </p:childTnLst>
+                                </p:cTn>
+                              </p:par>
+                            </p:childTnLst>
+                          </p:cTn>
+                        </p:par>
+                      </p:childTnLst>
+                    </p:cTn>
+                  </p:par>
+                </p:childTnLst>
+              </p:cTn>
+              <p:prevCondLst>
+                <p:cond evt="onPrev" delay="0">
+                  <p:tgtEl>
+                    <p:sldTgt/>
+                  </p:tgtEl>
+                </p:cond>
+              </p:prevCondLst>
+              <p:nextCondLst>
+                <p:cond evt="onNext" delay="0">
+                  <p:tgtEl>
+                    <p:sldTgt/>
+                  </p:tgtEl>
+                </p:cond>
+              </p:nextCondLst>
+            </p:seq>
+          </p:childTnLst>
+        </p:cTn>
+      </p:par>
+    </p:tnLst>
+    <p:bldLst>
+      <p:bldP spid="4" grpId="0" build="p"/>
+    </p:bldLst>
+  </p:timing>
 </p:sld>
 </file>
 
@@ -7145,7 +7786,15 @@
             </a:r>
             <a:r>
               <a:rPr lang="en-GB" dirty="0"/>
-              <a:t>the ”Action” or “Drama” genre</a:t>
+              <a:t>the ”Action” </a:t>
+            </a:r>
+            <a:r>
+              <a:rPr lang="en-GB" dirty="0" smtClean="0"/>
+              <a:t>and “Drama</a:t>
+            </a:r>
+            <a:r>
+              <a:rPr lang="en-GB" dirty="0"/>
+              <a:t>” genre</a:t>
             </a:r>
             <a:r>
               <a:rPr lang="en-GB" dirty="0" smtClean="0"/>
@@ -7188,6 +7837,161 @@
   <p:clrMapOvr>
     <a:masterClrMapping/>
   </p:clrMapOvr>
+  <p:timing>
+    <p:tnLst>
+      <p:par>
+        <p:cTn id="1" dur="indefinite" restart="never" nodeType="tmRoot">
+          <p:childTnLst>
+            <p:seq concurrent="1" nextAc="seek">
+              <p:cTn id="2" dur="indefinite" nodeType="mainSeq">
+                <p:childTnLst>
+                  <p:par>
+                    <p:cTn id="3" fill="hold">
+                      <p:stCondLst>
+                        <p:cond delay="indefinite"/>
+                      </p:stCondLst>
+                      <p:childTnLst>
+                        <p:par>
+                          <p:cTn id="4" fill="hold">
+                            <p:stCondLst>
+                              <p:cond delay="0"/>
+                            </p:stCondLst>
+                            <p:childTnLst>
+                              <p:par>
+                                <p:cTn id="5" presetID="18" presetClass="entr" presetSubtype="12" fill="hold" grpId="0" nodeType="clickEffect">
+                                  <p:stCondLst>
+                                    <p:cond delay="0"/>
+                                  </p:stCondLst>
+                                  <p:childTnLst>
+                                    <p:set>
+                                      <p:cBhvr>
+                                        <p:cTn id="6" dur="1" fill="hold">
+                                          <p:stCondLst>
+                                            <p:cond delay="0"/>
+                                          </p:stCondLst>
+                                        </p:cTn>
+                                        <p:tgtEl>
+                                          <p:spTgt spid="4">
+                                            <p:txEl>
+                                              <p:pRg st="0" end="0"/>
+                                            </p:txEl>
+                                          </p:spTgt>
+                                        </p:tgtEl>
+                                        <p:attrNameLst>
+                                          <p:attrName>style.visibility</p:attrName>
+                                        </p:attrNameLst>
+                                      </p:cBhvr>
+                                      <p:to>
+                                        <p:strVal val="visible"/>
+                                      </p:to>
+                                    </p:set>
+                                    <p:animEffect transition="in" filter="strips(downLeft)">
+                                      <p:cBhvr>
+                                        <p:cTn id="7" dur="500"/>
+                                        <p:tgtEl>
+                                          <p:spTgt spid="4">
+                                            <p:txEl>
+                                              <p:pRg st="0" end="0"/>
+                                            </p:txEl>
+                                          </p:spTgt>
+                                        </p:tgtEl>
+                                      </p:cBhvr>
+                                    </p:animEffect>
+                                  </p:childTnLst>
+                                </p:cTn>
+                              </p:par>
+                            </p:childTnLst>
+                          </p:cTn>
+                        </p:par>
+                      </p:childTnLst>
+                    </p:cTn>
+                  </p:par>
+                  <p:par>
+                    <p:cTn id="8" fill="hold">
+                      <p:stCondLst>
+                        <p:cond delay="indefinite"/>
+                      </p:stCondLst>
+                      <p:childTnLst>
+                        <p:par>
+                          <p:cTn id="9" fill="hold">
+                            <p:stCondLst>
+                              <p:cond delay="0"/>
+                            </p:stCondLst>
+                            <p:childTnLst>
+                              <p:par>
+                                <p:cTn id="10" presetID="18" presetClass="entr" presetSubtype="12" fill="hold" grpId="0" nodeType="clickEffect">
+                                  <p:stCondLst>
+                                    <p:cond delay="0"/>
+                                  </p:stCondLst>
+                                  <p:childTnLst>
+                                    <p:set>
+                                      <p:cBhvr>
+                                        <p:cTn id="11" dur="1" fill="hold">
+                                          <p:stCondLst>
+                                            <p:cond delay="0"/>
+                                          </p:stCondLst>
+                                        </p:cTn>
+                                        <p:tgtEl>
+                                          <p:spTgt spid="4">
+                                            <p:txEl>
+                                              <p:pRg st="2" end="2"/>
+                                            </p:txEl>
+                                          </p:spTgt>
+                                        </p:tgtEl>
+                                        <p:attrNameLst>
+                                          <p:attrName>style.visibility</p:attrName>
+                                        </p:attrNameLst>
+                                      </p:cBhvr>
+                                      <p:to>
+                                        <p:strVal val="visible"/>
+                                      </p:to>
+                                    </p:set>
+                                    <p:animEffect transition="in" filter="strips(downLeft)">
+                                      <p:cBhvr>
+                                        <p:cTn id="12" dur="500"/>
+                                        <p:tgtEl>
+                                          <p:spTgt spid="4">
+                                            <p:txEl>
+                                              <p:pRg st="2" end="2"/>
+                                            </p:txEl>
+                                          </p:spTgt>
+                                        </p:tgtEl>
+                                      </p:cBhvr>
+                                    </p:animEffect>
+                                  </p:childTnLst>
+                                </p:cTn>
+                              </p:par>
+                            </p:childTnLst>
+                          </p:cTn>
+                        </p:par>
+                      </p:childTnLst>
+                    </p:cTn>
+                  </p:par>
+                </p:childTnLst>
+              </p:cTn>
+              <p:prevCondLst>
+                <p:cond evt="onPrev" delay="0">
+                  <p:tgtEl>
+                    <p:sldTgt/>
+                  </p:tgtEl>
+                </p:cond>
+              </p:prevCondLst>
+              <p:nextCondLst>
+                <p:cond evt="onNext" delay="0">
+                  <p:tgtEl>
+                    <p:sldTgt/>
+                  </p:tgtEl>
+                </p:cond>
+              </p:nextCondLst>
+            </p:seq>
+          </p:childTnLst>
+        </p:cTn>
+      </p:par>
+    </p:tnLst>
+    <p:bldLst>
+      <p:bldP spid="4" grpId="0" build="p"/>
+    </p:bldLst>
+  </p:timing>
 </p:sld>
 </file>
 
@@ -7342,6 +8146,161 @@
   <p:clrMapOvr>
     <a:masterClrMapping/>
   </p:clrMapOvr>
+  <p:timing>
+    <p:tnLst>
+      <p:par>
+        <p:cTn id="1" dur="indefinite" restart="never" nodeType="tmRoot">
+          <p:childTnLst>
+            <p:seq concurrent="1" nextAc="seek">
+              <p:cTn id="2" dur="indefinite" nodeType="mainSeq">
+                <p:childTnLst>
+                  <p:par>
+                    <p:cTn id="3" fill="hold">
+                      <p:stCondLst>
+                        <p:cond delay="indefinite"/>
+                      </p:stCondLst>
+                      <p:childTnLst>
+                        <p:par>
+                          <p:cTn id="4" fill="hold">
+                            <p:stCondLst>
+                              <p:cond delay="0"/>
+                            </p:stCondLst>
+                            <p:childTnLst>
+                              <p:par>
+                                <p:cTn id="5" presetID="18" presetClass="entr" presetSubtype="12" fill="hold" grpId="0" nodeType="clickEffect">
+                                  <p:stCondLst>
+                                    <p:cond delay="0"/>
+                                  </p:stCondLst>
+                                  <p:childTnLst>
+                                    <p:set>
+                                      <p:cBhvr>
+                                        <p:cTn id="6" dur="1" fill="hold">
+                                          <p:stCondLst>
+                                            <p:cond delay="0"/>
+                                          </p:stCondLst>
+                                        </p:cTn>
+                                        <p:tgtEl>
+                                          <p:spTgt spid="4">
+                                            <p:txEl>
+                                              <p:pRg st="0" end="0"/>
+                                            </p:txEl>
+                                          </p:spTgt>
+                                        </p:tgtEl>
+                                        <p:attrNameLst>
+                                          <p:attrName>style.visibility</p:attrName>
+                                        </p:attrNameLst>
+                                      </p:cBhvr>
+                                      <p:to>
+                                        <p:strVal val="visible"/>
+                                      </p:to>
+                                    </p:set>
+                                    <p:animEffect transition="in" filter="strips(downLeft)">
+                                      <p:cBhvr>
+                                        <p:cTn id="7" dur="500"/>
+                                        <p:tgtEl>
+                                          <p:spTgt spid="4">
+                                            <p:txEl>
+                                              <p:pRg st="0" end="0"/>
+                                            </p:txEl>
+                                          </p:spTgt>
+                                        </p:tgtEl>
+                                      </p:cBhvr>
+                                    </p:animEffect>
+                                  </p:childTnLst>
+                                </p:cTn>
+                              </p:par>
+                            </p:childTnLst>
+                          </p:cTn>
+                        </p:par>
+                      </p:childTnLst>
+                    </p:cTn>
+                  </p:par>
+                  <p:par>
+                    <p:cTn id="8" fill="hold">
+                      <p:stCondLst>
+                        <p:cond delay="indefinite"/>
+                      </p:stCondLst>
+                      <p:childTnLst>
+                        <p:par>
+                          <p:cTn id="9" fill="hold">
+                            <p:stCondLst>
+                              <p:cond delay="0"/>
+                            </p:stCondLst>
+                            <p:childTnLst>
+                              <p:par>
+                                <p:cTn id="10" presetID="18" presetClass="entr" presetSubtype="12" fill="hold" grpId="0" nodeType="clickEffect">
+                                  <p:stCondLst>
+                                    <p:cond delay="0"/>
+                                  </p:stCondLst>
+                                  <p:childTnLst>
+                                    <p:set>
+                                      <p:cBhvr>
+                                        <p:cTn id="11" dur="1" fill="hold">
+                                          <p:stCondLst>
+                                            <p:cond delay="0"/>
+                                          </p:stCondLst>
+                                        </p:cTn>
+                                        <p:tgtEl>
+                                          <p:spTgt spid="4">
+                                            <p:txEl>
+                                              <p:pRg st="2" end="2"/>
+                                            </p:txEl>
+                                          </p:spTgt>
+                                        </p:tgtEl>
+                                        <p:attrNameLst>
+                                          <p:attrName>style.visibility</p:attrName>
+                                        </p:attrNameLst>
+                                      </p:cBhvr>
+                                      <p:to>
+                                        <p:strVal val="visible"/>
+                                      </p:to>
+                                    </p:set>
+                                    <p:animEffect transition="in" filter="strips(downLeft)">
+                                      <p:cBhvr>
+                                        <p:cTn id="12" dur="500"/>
+                                        <p:tgtEl>
+                                          <p:spTgt spid="4">
+                                            <p:txEl>
+                                              <p:pRg st="2" end="2"/>
+                                            </p:txEl>
+                                          </p:spTgt>
+                                        </p:tgtEl>
+                                      </p:cBhvr>
+                                    </p:animEffect>
+                                  </p:childTnLst>
+                                </p:cTn>
+                              </p:par>
+                            </p:childTnLst>
+                          </p:cTn>
+                        </p:par>
+                      </p:childTnLst>
+                    </p:cTn>
+                  </p:par>
+                </p:childTnLst>
+              </p:cTn>
+              <p:prevCondLst>
+                <p:cond evt="onPrev" delay="0">
+                  <p:tgtEl>
+                    <p:sldTgt/>
+                  </p:tgtEl>
+                </p:cond>
+              </p:prevCondLst>
+              <p:nextCondLst>
+                <p:cond evt="onNext" delay="0">
+                  <p:tgtEl>
+                    <p:sldTgt/>
+                  </p:tgtEl>
+                </p:cond>
+              </p:nextCondLst>
+            </p:seq>
+          </p:childTnLst>
+        </p:cTn>
+      </p:par>
+    </p:tnLst>
+    <p:bldLst>
+      <p:bldP spid="4" grpId="0" build="p"/>
+    </p:bldLst>
+  </p:timing>
 </p:sld>
 </file>
 
@@ -7548,6 +8507,161 @@
   <p:clrMapOvr>
     <a:masterClrMapping/>
   </p:clrMapOvr>
+  <p:timing>
+    <p:tnLst>
+      <p:par>
+        <p:cTn id="1" dur="indefinite" restart="never" nodeType="tmRoot">
+          <p:childTnLst>
+            <p:seq concurrent="1" nextAc="seek">
+              <p:cTn id="2" dur="indefinite" nodeType="mainSeq">
+                <p:childTnLst>
+                  <p:par>
+                    <p:cTn id="3" fill="hold">
+                      <p:stCondLst>
+                        <p:cond delay="indefinite"/>
+                      </p:stCondLst>
+                      <p:childTnLst>
+                        <p:par>
+                          <p:cTn id="4" fill="hold">
+                            <p:stCondLst>
+                              <p:cond delay="0"/>
+                            </p:stCondLst>
+                            <p:childTnLst>
+                              <p:par>
+                                <p:cTn id="5" presetID="18" presetClass="entr" presetSubtype="12" fill="hold" grpId="0" nodeType="clickEffect">
+                                  <p:stCondLst>
+                                    <p:cond delay="0"/>
+                                  </p:stCondLst>
+                                  <p:childTnLst>
+                                    <p:set>
+                                      <p:cBhvr>
+                                        <p:cTn id="6" dur="1" fill="hold">
+                                          <p:stCondLst>
+                                            <p:cond delay="0"/>
+                                          </p:stCondLst>
+                                        </p:cTn>
+                                        <p:tgtEl>
+                                          <p:spTgt spid="4">
+                                            <p:txEl>
+                                              <p:pRg st="0" end="0"/>
+                                            </p:txEl>
+                                          </p:spTgt>
+                                        </p:tgtEl>
+                                        <p:attrNameLst>
+                                          <p:attrName>style.visibility</p:attrName>
+                                        </p:attrNameLst>
+                                      </p:cBhvr>
+                                      <p:to>
+                                        <p:strVal val="visible"/>
+                                      </p:to>
+                                    </p:set>
+                                    <p:animEffect transition="in" filter="strips(downLeft)">
+                                      <p:cBhvr>
+                                        <p:cTn id="7" dur="500"/>
+                                        <p:tgtEl>
+                                          <p:spTgt spid="4">
+                                            <p:txEl>
+                                              <p:pRg st="0" end="0"/>
+                                            </p:txEl>
+                                          </p:spTgt>
+                                        </p:tgtEl>
+                                      </p:cBhvr>
+                                    </p:animEffect>
+                                  </p:childTnLst>
+                                </p:cTn>
+                              </p:par>
+                            </p:childTnLst>
+                          </p:cTn>
+                        </p:par>
+                      </p:childTnLst>
+                    </p:cTn>
+                  </p:par>
+                  <p:par>
+                    <p:cTn id="8" fill="hold">
+                      <p:stCondLst>
+                        <p:cond delay="indefinite"/>
+                      </p:stCondLst>
+                      <p:childTnLst>
+                        <p:par>
+                          <p:cTn id="9" fill="hold">
+                            <p:stCondLst>
+                              <p:cond delay="0"/>
+                            </p:stCondLst>
+                            <p:childTnLst>
+                              <p:par>
+                                <p:cTn id="10" presetID="18" presetClass="entr" presetSubtype="12" fill="hold" grpId="0" nodeType="clickEffect">
+                                  <p:stCondLst>
+                                    <p:cond delay="0"/>
+                                  </p:stCondLst>
+                                  <p:childTnLst>
+                                    <p:set>
+                                      <p:cBhvr>
+                                        <p:cTn id="11" dur="1" fill="hold">
+                                          <p:stCondLst>
+                                            <p:cond delay="0"/>
+                                          </p:stCondLst>
+                                        </p:cTn>
+                                        <p:tgtEl>
+                                          <p:spTgt spid="4">
+                                            <p:txEl>
+                                              <p:pRg st="2" end="2"/>
+                                            </p:txEl>
+                                          </p:spTgt>
+                                        </p:tgtEl>
+                                        <p:attrNameLst>
+                                          <p:attrName>style.visibility</p:attrName>
+                                        </p:attrNameLst>
+                                      </p:cBhvr>
+                                      <p:to>
+                                        <p:strVal val="visible"/>
+                                      </p:to>
+                                    </p:set>
+                                    <p:animEffect transition="in" filter="strips(downLeft)">
+                                      <p:cBhvr>
+                                        <p:cTn id="12" dur="500"/>
+                                        <p:tgtEl>
+                                          <p:spTgt spid="4">
+                                            <p:txEl>
+                                              <p:pRg st="2" end="2"/>
+                                            </p:txEl>
+                                          </p:spTgt>
+                                        </p:tgtEl>
+                                      </p:cBhvr>
+                                    </p:animEffect>
+                                  </p:childTnLst>
+                                </p:cTn>
+                              </p:par>
+                            </p:childTnLst>
+                          </p:cTn>
+                        </p:par>
+                      </p:childTnLst>
+                    </p:cTn>
+                  </p:par>
+                </p:childTnLst>
+              </p:cTn>
+              <p:prevCondLst>
+                <p:cond evt="onPrev" delay="0">
+                  <p:tgtEl>
+                    <p:sldTgt/>
+                  </p:tgtEl>
+                </p:cond>
+              </p:prevCondLst>
+              <p:nextCondLst>
+                <p:cond evt="onNext" delay="0">
+                  <p:tgtEl>
+                    <p:sldTgt/>
+                  </p:tgtEl>
+                </p:cond>
+              </p:nextCondLst>
+            </p:seq>
+          </p:childTnLst>
+        </p:cTn>
+      </p:par>
+    </p:tnLst>
+    <p:bldLst>
+      <p:bldP spid="4" grpId="0" build="p"/>
+    </p:bldLst>
+  </p:timing>
 </p:sld>
 </file>
 
@@ -7723,7 +8837,15 @@
             </a:r>
             <a:r>
               <a:rPr lang="en-GB" dirty="0" smtClean="0"/>
-              <a:t>after1970 and 1980.</a:t>
+              <a:t>before 1960 </a:t>
+            </a:r>
+            <a:r>
+              <a:rPr lang="en-GB" dirty="0" smtClean="0"/>
+              <a:t>and </a:t>
+            </a:r>
+            <a:r>
+              <a:rPr lang="en-GB" dirty="0" smtClean="0"/>
+              <a:t>after 1990.</a:t>
             </a:r>
             <a:endParaRPr lang="en-GB" dirty="0"/>
           </a:p>
@@ -7775,6 +8897,161 @@
   <p:clrMapOvr>
     <a:masterClrMapping/>
   </p:clrMapOvr>
+  <p:timing>
+    <p:tnLst>
+      <p:par>
+        <p:cTn id="1" dur="indefinite" restart="never" nodeType="tmRoot">
+          <p:childTnLst>
+            <p:seq concurrent="1" nextAc="seek">
+              <p:cTn id="2" dur="indefinite" nodeType="mainSeq">
+                <p:childTnLst>
+                  <p:par>
+                    <p:cTn id="3" fill="hold">
+                      <p:stCondLst>
+                        <p:cond delay="indefinite"/>
+                      </p:stCondLst>
+                      <p:childTnLst>
+                        <p:par>
+                          <p:cTn id="4" fill="hold">
+                            <p:stCondLst>
+                              <p:cond delay="0"/>
+                            </p:stCondLst>
+                            <p:childTnLst>
+                              <p:par>
+                                <p:cTn id="5" presetID="18" presetClass="entr" presetSubtype="12" fill="hold" grpId="0" nodeType="clickEffect">
+                                  <p:stCondLst>
+                                    <p:cond delay="0"/>
+                                  </p:stCondLst>
+                                  <p:childTnLst>
+                                    <p:set>
+                                      <p:cBhvr>
+                                        <p:cTn id="6" dur="1" fill="hold">
+                                          <p:stCondLst>
+                                            <p:cond delay="0"/>
+                                          </p:stCondLst>
+                                        </p:cTn>
+                                        <p:tgtEl>
+                                          <p:spTgt spid="4">
+                                            <p:txEl>
+                                              <p:pRg st="0" end="0"/>
+                                            </p:txEl>
+                                          </p:spTgt>
+                                        </p:tgtEl>
+                                        <p:attrNameLst>
+                                          <p:attrName>style.visibility</p:attrName>
+                                        </p:attrNameLst>
+                                      </p:cBhvr>
+                                      <p:to>
+                                        <p:strVal val="visible"/>
+                                      </p:to>
+                                    </p:set>
+                                    <p:animEffect transition="in" filter="strips(downLeft)">
+                                      <p:cBhvr>
+                                        <p:cTn id="7" dur="500"/>
+                                        <p:tgtEl>
+                                          <p:spTgt spid="4">
+                                            <p:txEl>
+                                              <p:pRg st="0" end="0"/>
+                                            </p:txEl>
+                                          </p:spTgt>
+                                        </p:tgtEl>
+                                      </p:cBhvr>
+                                    </p:animEffect>
+                                  </p:childTnLst>
+                                </p:cTn>
+                              </p:par>
+                            </p:childTnLst>
+                          </p:cTn>
+                        </p:par>
+                      </p:childTnLst>
+                    </p:cTn>
+                  </p:par>
+                  <p:par>
+                    <p:cTn id="8" fill="hold">
+                      <p:stCondLst>
+                        <p:cond delay="indefinite"/>
+                      </p:stCondLst>
+                      <p:childTnLst>
+                        <p:par>
+                          <p:cTn id="9" fill="hold">
+                            <p:stCondLst>
+                              <p:cond delay="0"/>
+                            </p:stCondLst>
+                            <p:childTnLst>
+                              <p:par>
+                                <p:cTn id="10" presetID="18" presetClass="entr" presetSubtype="12" fill="hold" grpId="0" nodeType="clickEffect">
+                                  <p:stCondLst>
+                                    <p:cond delay="0"/>
+                                  </p:stCondLst>
+                                  <p:childTnLst>
+                                    <p:set>
+                                      <p:cBhvr>
+                                        <p:cTn id="11" dur="1" fill="hold">
+                                          <p:stCondLst>
+                                            <p:cond delay="0"/>
+                                          </p:stCondLst>
+                                        </p:cTn>
+                                        <p:tgtEl>
+                                          <p:spTgt spid="4">
+                                            <p:txEl>
+                                              <p:pRg st="2" end="2"/>
+                                            </p:txEl>
+                                          </p:spTgt>
+                                        </p:tgtEl>
+                                        <p:attrNameLst>
+                                          <p:attrName>style.visibility</p:attrName>
+                                        </p:attrNameLst>
+                                      </p:cBhvr>
+                                      <p:to>
+                                        <p:strVal val="visible"/>
+                                      </p:to>
+                                    </p:set>
+                                    <p:animEffect transition="in" filter="strips(downLeft)">
+                                      <p:cBhvr>
+                                        <p:cTn id="12" dur="500"/>
+                                        <p:tgtEl>
+                                          <p:spTgt spid="4">
+                                            <p:txEl>
+                                              <p:pRg st="2" end="2"/>
+                                            </p:txEl>
+                                          </p:spTgt>
+                                        </p:tgtEl>
+                                      </p:cBhvr>
+                                    </p:animEffect>
+                                  </p:childTnLst>
+                                </p:cTn>
+                              </p:par>
+                            </p:childTnLst>
+                          </p:cTn>
+                        </p:par>
+                      </p:childTnLst>
+                    </p:cTn>
+                  </p:par>
+                </p:childTnLst>
+              </p:cTn>
+              <p:prevCondLst>
+                <p:cond evt="onPrev" delay="0">
+                  <p:tgtEl>
+                    <p:sldTgt/>
+                  </p:tgtEl>
+                </p:cond>
+              </p:prevCondLst>
+              <p:nextCondLst>
+                <p:cond evt="onNext" delay="0">
+                  <p:tgtEl>
+                    <p:sldTgt/>
+                  </p:tgtEl>
+                </p:cond>
+              </p:nextCondLst>
+            </p:seq>
+          </p:childTnLst>
+        </p:cTn>
+      </p:par>
+    </p:tnLst>
+    <p:bldLst>
+      <p:bldP spid="4" grpId="0" build="p"/>
+    </p:bldLst>
+  </p:timing>
 </p:sld>
 </file>
 
@@ -7970,6 +9247,161 @@
   <p:clrMapOvr>
     <a:masterClrMapping/>
   </p:clrMapOvr>
+  <p:timing>
+    <p:tnLst>
+      <p:par>
+        <p:cTn id="1" dur="indefinite" restart="never" nodeType="tmRoot">
+          <p:childTnLst>
+            <p:seq concurrent="1" nextAc="seek">
+              <p:cTn id="2" dur="indefinite" nodeType="mainSeq">
+                <p:childTnLst>
+                  <p:par>
+                    <p:cTn id="3" fill="hold">
+                      <p:stCondLst>
+                        <p:cond delay="indefinite"/>
+                      </p:stCondLst>
+                      <p:childTnLst>
+                        <p:par>
+                          <p:cTn id="4" fill="hold">
+                            <p:stCondLst>
+                              <p:cond delay="0"/>
+                            </p:stCondLst>
+                            <p:childTnLst>
+                              <p:par>
+                                <p:cTn id="5" presetID="18" presetClass="entr" presetSubtype="12" fill="hold" grpId="0" nodeType="clickEffect">
+                                  <p:stCondLst>
+                                    <p:cond delay="0"/>
+                                  </p:stCondLst>
+                                  <p:childTnLst>
+                                    <p:set>
+                                      <p:cBhvr>
+                                        <p:cTn id="6" dur="1" fill="hold">
+                                          <p:stCondLst>
+                                            <p:cond delay="0"/>
+                                          </p:stCondLst>
+                                        </p:cTn>
+                                        <p:tgtEl>
+                                          <p:spTgt spid="4">
+                                            <p:txEl>
+                                              <p:pRg st="0" end="0"/>
+                                            </p:txEl>
+                                          </p:spTgt>
+                                        </p:tgtEl>
+                                        <p:attrNameLst>
+                                          <p:attrName>style.visibility</p:attrName>
+                                        </p:attrNameLst>
+                                      </p:cBhvr>
+                                      <p:to>
+                                        <p:strVal val="visible"/>
+                                      </p:to>
+                                    </p:set>
+                                    <p:animEffect transition="in" filter="strips(downLeft)">
+                                      <p:cBhvr>
+                                        <p:cTn id="7" dur="500"/>
+                                        <p:tgtEl>
+                                          <p:spTgt spid="4">
+                                            <p:txEl>
+                                              <p:pRg st="0" end="0"/>
+                                            </p:txEl>
+                                          </p:spTgt>
+                                        </p:tgtEl>
+                                      </p:cBhvr>
+                                    </p:animEffect>
+                                  </p:childTnLst>
+                                </p:cTn>
+                              </p:par>
+                            </p:childTnLst>
+                          </p:cTn>
+                        </p:par>
+                      </p:childTnLst>
+                    </p:cTn>
+                  </p:par>
+                  <p:par>
+                    <p:cTn id="8" fill="hold">
+                      <p:stCondLst>
+                        <p:cond delay="indefinite"/>
+                      </p:stCondLst>
+                      <p:childTnLst>
+                        <p:par>
+                          <p:cTn id="9" fill="hold">
+                            <p:stCondLst>
+                              <p:cond delay="0"/>
+                            </p:stCondLst>
+                            <p:childTnLst>
+                              <p:par>
+                                <p:cTn id="10" presetID="18" presetClass="entr" presetSubtype="12" fill="hold" grpId="0" nodeType="clickEffect">
+                                  <p:stCondLst>
+                                    <p:cond delay="0"/>
+                                  </p:stCondLst>
+                                  <p:childTnLst>
+                                    <p:set>
+                                      <p:cBhvr>
+                                        <p:cTn id="11" dur="1" fill="hold">
+                                          <p:stCondLst>
+                                            <p:cond delay="0"/>
+                                          </p:stCondLst>
+                                        </p:cTn>
+                                        <p:tgtEl>
+                                          <p:spTgt spid="4">
+                                            <p:txEl>
+                                              <p:pRg st="2" end="2"/>
+                                            </p:txEl>
+                                          </p:spTgt>
+                                        </p:tgtEl>
+                                        <p:attrNameLst>
+                                          <p:attrName>style.visibility</p:attrName>
+                                        </p:attrNameLst>
+                                      </p:cBhvr>
+                                      <p:to>
+                                        <p:strVal val="visible"/>
+                                      </p:to>
+                                    </p:set>
+                                    <p:animEffect transition="in" filter="strips(downLeft)">
+                                      <p:cBhvr>
+                                        <p:cTn id="12" dur="500"/>
+                                        <p:tgtEl>
+                                          <p:spTgt spid="4">
+                                            <p:txEl>
+                                              <p:pRg st="2" end="2"/>
+                                            </p:txEl>
+                                          </p:spTgt>
+                                        </p:tgtEl>
+                                      </p:cBhvr>
+                                    </p:animEffect>
+                                  </p:childTnLst>
+                                </p:cTn>
+                              </p:par>
+                            </p:childTnLst>
+                          </p:cTn>
+                        </p:par>
+                      </p:childTnLst>
+                    </p:cTn>
+                  </p:par>
+                </p:childTnLst>
+              </p:cTn>
+              <p:prevCondLst>
+                <p:cond evt="onPrev" delay="0">
+                  <p:tgtEl>
+                    <p:sldTgt/>
+                  </p:tgtEl>
+                </p:cond>
+              </p:prevCondLst>
+              <p:nextCondLst>
+                <p:cond evt="onNext" delay="0">
+                  <p:tgtEl>
+                    <p:sldTgt/>
+                  </p:tgtEl>
+                </p:cond>
+              </p:nextCondLst>
+            </p:seq>
+          </p:childTnLst>
+        </p:cTn>
+      </p:par>
+    </p:tnLst>
+    <p:bldLst>
+      <p:bldP spid="4" grpId="0" build="p"/>
+    </p:bldLst>
+  </p:timing>
 </p:sld>
 </file>
 

</xml_diff>